<commit_message>
Finish animations and some formatting changes
</commit_message>
<xml_diff>
--- a/Working collaboratively with Git.pptx
+++ b/Working collaboratively with Git.pptx
@@ -6048,24 +6048,28 @@
             </a:r>
           </a:p>
           <a:p>
+            <a:pPr lvl="1"/>
             <a:r>
               <a:rPr lang="en-GB" dirty="0"/>
               <a:t>On your branch, pull the other developers changes from the remote branch</a:t>
             </a:r>
           </a:p>
           <a:p>
+            <a:pPr lvl="1"/>
             <a:r>
               <a:rPr lang="en-GB" dirty="0"/>
               <a:t>This will mix their code to yours – so this can look really messy and confusing</a:t>
             </a:r>
           </a:p>
           <a:p>
+            <a:pPr lvl="1"/>
             <a:r>
               <a:rPr lang="en-GB" dirty="0"/>
               <a:t>Manually fix the conflict by choosing the right code </a:t>
             </a:r>
           </a:p>
           <a:p>
+            <a:pPr lvl="1"/>
             <a:r>
               <a:rPr lang="en-GB" dirty="0"/>
               <a:t>Don’t forget to then commit and push your commit again</a:t>
@@ -6107,6 +6111,328 @@
   <p:clrMapOvr>
     <a:masterClrMapping/>
   </p:clrMapOvr>
+  <p:timing>
+    <p:tnLst>
+      <p:par>
+        <p:cTn id="1" dur="indefinite" restart="never" nodeType="tmRoot">
+          <p:childTnLst>
+            <p:seq concurrent="1" nextAc="seek">
+              <p:cTn id="2" dur="indefinite" nodeType="mainSeq">
+                <p:childTnLst>
+                  <p:par>
+                    <p:cTn id="3" fill="hold">
+                      <p:stCondLst>
+                        <p:cond delay="indefinite"/>
+                      </p:stCondLst>
+                      <p:childTnLst>
+                        <p:par>
+                          <p:cTn id="4" fill="hold">
+                            <p:stCondLst>
+                              <p:cond delay="0"/>
+                            </p:stCondLst>
+                            <p:childTnLst>
+                              <p:par>
+                                <p:cTn id="5" presetID="1" presetClass="entr" presetSubtype="0" fill="hold" grpId="0" nodeType="clickEffect">
+                                  <p:stCondLst>
+                                    <p:cond delay="0"/>
+                                  </p:stCondLst>
+                                  <p:childTnLst>
+                                    <p:set>
+                                      <p:cBhvr>
+                                        <p:cTn id="6" dur="1" fill="hold">
+                                          <p:stCondLst>
+                                            <p:cond delay="0"/>
+                                          </p:stCondLst>
+                                        </p:cTn>
+                                        <p:tgtEl>
+                                          <p:spTgt spid="3">
+                                            <p:txEl>
+                                              <p:pRg st="0" end="0"/>
+                                            </p:txEl>
+                                          </p:spTgt>
+                                        </p:tgtEl>
+                                        <p:attrNameLst>
+                                          <p:attrName>style.visibility</p:attrName>
+                                        </p:attrNameLst>
+                                      </p:cBhvr>
+                                      <p:to>
+                                        <p:strVal val="visible"/>
+                                      </p:to>
+                                    </p:set>
+                                  </p:childTnLst>
+                                </p:cTn>
+                              </p:par>
+                            </p:childTnLst>
+                          </p:cTn>
+                        </p:par>
+                      </p:childTnLst>
+                    </p:cTn>
+                  </p:par>
+                  <p:par>
+                    <p:cTn id="7" fill="hold">
+                      <p:stCondLst>
+                        <p:cond delay="indefinite"/>
+                      </p:stCondLst>
+                      <p:childTnLst>
+                        <p:par>
+                          <p:cTn id="8" fill="hold">
+                            <p:stCondLst>
+                              <p:cond delay="0"/>
+                            </p:stCondLst>
+                            <p:childTnLst>
+                              <p:par>
+                                <p:cTn id="9" presetID="1" presetClass="entr" presetSubtype="0" fill="hold" grpId="0" nodeType="clickEffect">
+                                  <p:stCondLst>
+                                    <p:cond delay="0"/>
+                                  </p:stCondLst>
+                                  <p:childTnLst>
+                                    <p:set>
+                                      <p:cBhvr>
+                                        <p:cTn id="10" dur="1" fill="hold">
+                                          <p:stCondLst>
+                                            <p:cond delay="0"/>
+                                          </p:stCondLst>
+                                        </p:cTn>
+                                        <p:tgtEl>
+                                          <p:spTgt spid="3">
+                                            <p:txEl>
+                                              <p:pRg st="1" end="1"/>
+                                            </p:txEl>
+                                          </p:spTgt>
+                                        </p:tgtEl>
+                                        <p:attrNameLst>
+                                          <p:attrName>style.visibility</p:attrName>
+                                        </p:attrNameLst>
+                                      </p:cBhvr>
+                                      <p:to>
+                                        <p:strVal val="visible"/>
+                                      </p:to>
+                                    </p:set>
+                                  </p:childTnLst>
+                                </p:cTn>
+                              </p:par>
+                            </p:childTnLst>
+                          </p:cTn>
+                        </p:par>
+                      </p:childTnLst>
+                    </p:cTn>
+                  </p:par>
+                  <p:par>
+                    <p:cTn id="11" fill="hold">
+                      <p:stCondLst>
+                        <p:cond delay="indefinite"/>
+                      </p:stCondLst>
+                      <p:childTnLst>
+                        <p:par>
+                          <p:cTn id="12" fill="hold">
+                            <p:stCondLst>
+                              <p:cond delay="0"/>
+                            </p:stCondLst>
+                            <p:childTnLst>
+                              <p:par>
+                                <p:cTn id="13" presetID="1" presetClass="entr" presetSubtype="0" fill="hold" grpId="0" nodeType="clickEffect">
+                                  <p:stCondLst>
+                                    <p:cond delay="0"/>
+                                  </p:stCondLst>
+                                  <p:childTnLst>
+                                    <p:set>
+                                      <p:cBhvr>
+                                        <p:cTn id="14" dur="1" fill="hold">
+                                          <p:stCondLst>
+                                            <p:cond delay="0"/>
+                                          </p:stCondLst>
+                                        </p:cTn>
+                                        <p:tgtEl>
+                                          <p:spTgt spid="3">
+                                            <p:txEl>
+                                              <p:pRg st="2" end="2"/>
+                                            </p:txEl>
+                                          </p:spTgt>
+                                        </p:tgtEl>
+                                        <p:attrNameLst>
+                                          <p:attrName>style.visibility</p:attrName>
+                                        </p:attrNameLst>
+                                      </p:cBhvr>
+                                      <p:to>
+                                        <p:strVal val="visible"/>
+                                      </p:to>
+                                    </p:set>
+                                  </p:childTnLst>
+                                </p:cTn>
+                              </p:par>
+                            </p:childTnLst>
+                          </p:cTn>
+                        </p:par>
+                      </p:childTnLst>
+                    </p:cTn>
+                  </p:par>
+                  <p:par>
+                    <p:cTn id="15" fill="hold">
+                      <p:stCondLst>
+                        <p:cond delay="indefinite"/>
+                      </p:stCondLst>
+                      <p:childTnLst>
+                        <p:par>
+                          <p:cTn id="16" fill="hold">
+                            <p:stCondLst>
+                              <p:cond delay="0"/>
+                            </p:stCondLst>
+                            <p:childTnLst>
+                              <p:par>
+                                <p:cTn id="17" presetID="1" presetClass="entr" presetSubtype="0" fill="hold" nodeType="clickEffect">
+                                  <p:stCondLst>
+                                    <p:cond delay="0"/>
+                                  </p:stCondLst>
+                                  <p:childTnLst>
+                                    <p:set>
+                                      <p:cBhvr>
+                                        <p:cTn id="18" dur="1" fill="hold">
+                                          <p:stCondLst>
+                                            <p:cond delay="0"/>
+                                          </p:stCondLst>
+                                        </p:cTn>
+                                        <p:tgtEl>
+                                          <p:spTgt spid="3">
+                                            <p:txEl>
+                                              <p:pRg st="3" end="3"/>
+                                            </p:txEl>
+                                          </p:spTgt>
+                                        </p:tgtEl>
+                                        <p:attrNameLst>
+                                          <p:attrName>style.visibility</p:attrName>
+                                        </p:attrNameLst>
+                                      </p:cBhvr>
+                                      <p:to>
+                                        <p:strVal val="visible"/>
+                                      </p:to>
+                                    </p:set>
+                                  </p:childTnLst>
+                                </p:cTn>
+                              </p:par>
+                              <p:par>
+                                <p:cTn id="19" presetID="1" presetClass="entr" presetSubtype="0" fill="hold" nodeType="withEffect">
+                                  <p:stCondLst>
+                                    <p:cond delay="0"/>
+                                  </p:stCondLst>
+                                  <p:childTnLst>
+                                    <p:set>
+                                      <p:cBhvr>
+                                        <p:cTn id="20" dur="1" fill="hold">
+                                          <p:stCondLst>
+                                            <p:cond delay="0"/>
+                                          </p:stCondLst>
+                                        </p:cTn>
+                                        <p:tgtEl>
+                                          <p:spTgt spid="3">
+                                            <p:txEl>
+                                              <p:pRg st="4" end="4"/>
+                                            </p:txEl>
+                                          </p:spTgt>
+                                        </p:tgtEl>
+                                        <p:attrNameLst>
+                                          <p:attrName>style.visibility</p:attrName>
+                                        </p:attrNameLst>
+                                      </p:cBhvr>
+                                      <p:to>
+                                        <p:strVal val="visible"/>
+                                      </p:to>
+                                    </p:set>
+                                  </p:childTnLst>
+                                </p:cTn>
+                              </p:par>
+                              <p:par>
+                                <p:cTn id="21" presetID="1" presetClass="entr" presetSubtype="0" fill="hold" nodeType="withEffect">
+                                  <p:stCondLst>
+                                    <p:cond delay="0"/>
+                                  </p:stCondLst>
+                                  <p:childTnLst>
+                                    <p:set>
+                                      <p:cBhvr>
+                                        <p:cTn id="22" dur="1" fill="hold">
+                                          <p:stCondLst>
+                                            <p:cond delay="0"/>
+                                          </p:stCondLst>
+                                        </p:cTn>
+                                        <p:tgtEl>
+                                          <p:spTgt spid="3">
+                                            <p:txEl>
+                                              <p:pRg st="5" end="5"/>
+                                            </p:txEl>
+                                          </p:spTgt>
+                                        </p:tgtEl>
+                                        <p:attrNameLst>
+                                          <p:attrName>style.visibility</p:attrName>
+                                        </p:attrNameLst>
+                                      </p:cBhvr>
+                                      <p:to>
+                                        <p:strVal val="visible"/>
+                                      </p:to>
+                                    </p:set>
+                                  </p:childTnLst>
+                                </p:cTn>
+                              </p:par>
+                              <p:par>
+                                <p:cTn id="23" presetID="1" presetClass="entr" presetSubtype="0" fill="hold" nodeType="withEffect">
+                                  <p:stCondLst>
+                                    <p:cond delay="0"/>
+                                  </p:stCondLst>
+                                  <p:childTnLst>
+                                    <p:set>
+                                      <p:cBhvr>
+                                        <p:cTn id="24" dur="1" fill="hold">
+                                          <p:stCondLst>
+                                            <p:cond delay="0"/>
+                                          </p:stCondLst>
+                                        </p:cTn>
+                                        <p:tgtEl>
+                                          <p:spTgt spid="3">
+                                            <p:txEl>
+                                              <p:pRg st="6" end="6"/>
+                                            </p:txEl>
+                                          </p:spTgt>
+                                        </p:tgtEl>
+                                        <p:attrNameLst>
+                                          <p:attrName>style.visibility</p:attrName>
+                                        </p:attrNameLst>
+                                      </p:cBhvr>
+                                      <p:to>
+                                        <p:strVal val="visible"/>
+                                      </p:to>
+                                    </p:set>
+                                  </p:childTnLst>
+                                </p:cTn>
+                              </p:par>
+                            </p:childTnLst>
+                          </p:cTn>
+                        </p:par>
+                      </p:childTnLst>
+                    </p:cTn>
+                  </p:par>
+                </p:childTnLst>
+              </p:cTn>
+              <p:prevCondLst>
+                <p:cond evt="onPrev" delay="0">
+                  <p:tgtEl>
+                    <p:sldTgt/>
+                  </p:tgtEl>
+                </p:cond>
+              </p:prevCondLst>
+              <p:nextCondLst>
+                <p:cond evt="onNext" delay="0">
+                  <p:tgtEl>
+                    <p:sldTgt/>
+                  </p:tgtEl>
+                </p:cond>
+              </p:nextCondLst>
+            </p:seq>
+          </p:childTnLst>
+        </p:cTn>
+      </p:par>
+    </p:tnLst>
+    <p:bldLst>
+      <p:bldP spid="3" grpId="0" uiExpand="1" build="p"/>
+    </p:bldLst>
+  </p:timing>
 </p:sld>
 </file>
 
@@ -6178,42 +6504,33 @@
           </a:bodyPr>
           <a:lstStyle/>
           <a:p>
-            <a:pPr marL="0" indent="0">
-              <a:buNone/>
-            </a:pPr>
             <a:r>
               <a:rPr lang="en-GB" dirty="0"/>
               <a:t>Before making a pull requests:</a:t>
             </a:r>
           </a:p>
           <a:p>
+            <a:pPr lvl="1"/>
             <a:r>
               <a:rPr lang="en-GB" dirty="0"/>
               <a:t>Make sure your build passes</a:t>
             </a:r>
           </a:p>
           <a:p>
+            <a:pPr lvl="1"/>
             <a:r>
               <a:rPr lang="en-GB" dirty="0"/>
               <a:t>Check your code compiles</a:t>
             </a:r>
           </a:p>
           <a:p>
+            <a:pPr lvl="1"/>
             <a:r>
               <a:rPr lang="en-GB" dirty="0"/>
               <a:t>Check you have fully implemented the feature</a:t>
             </a:r>
           </a:p>
           <a:p>
-            <a:endParaRPr lang="en-GB" dirty="0"/>
-          </a:p>
-          <a:p>
-            <a:pPr marL="0" indent="0">
-              <a:buNone/>
-            </a:pPr>
-            <a:endParaRPr lang="en-GB" dirty="0"/>
-          </a:p>
-          <a:p>
             <a:r>
               <a:rPr lang="en-GB" dirty="0"/>
               <a:t>Pull requests are either approved or rejected (meaning they need more work)</a:t>
@@ -6232,6 +6549,9 @@
             </a:r>
           </a:p>
           <a:p>
+            <a:pPr marL="0" indent="0">
+              <a:buNone/>
+            </a:pPr>
             <a:endParaRPr lang="en-GB" dirty="0"/>
           </a:p>
         </p:txBody>
@@ -6289,7 +6609,7 @@
           <a:p>
             <a:r>
               <a:rPr lang="en-GB" dirty="0"/>
-              <a:t>Useful Pull Requests tips</a:t>
+              <a:t>Pull requests best practices</a:t>
             </a:r>
           </a:p>
         </p:txBody>
@@ -6349,15 +6669,7 @@
           <a:p>
             <a:r>
               <a:rPr lang="en-GB" dirty="0"/>
-              <a:t>When reviewing pull </a:t>
-            </a:r>
-            <a:r>
-              <a:rPr lang="en-GB"/>
-              <a:t>requests please be </a:t>
-            </a:r>
-            <a:r>
-              <a:rPr lang="en-GB" dirty="0"/>
-              <a:t>helpful and constructive!</a:t>
+              <a:t>When reviewing pull requests please be helpful and constructive!</a:t>
             </a:r>
           </a:p>
           <a:p>
@@ -6532,10 +6844,16 @@
               <a:t>Work through </a:t>
             </a:r>
             <a:r>
+              <a:rPr lang="en-GB" dirty="0">
+                <a:hlinkClick r:id="rId3" tooltip="# Working collaboratively with git.md"/>
+              </a:rPr>
+              <a:t>Working collaboratively with git</a:t>
+            </a:r>
+            <a:r>
               <a:rPr lang="en-US" dirty="0">
-                <a:hlinkClick r:id="rId3" tooltip="meetup-api-workshop.md"/>
+                <a:hlinkClick r:id="rId4" tooltip="meetup-api-workshop.md"/>
               </a:rPr>
-              <a:t>meetup-git-workshop.md</a:t>
+              <a:t>.md</a:t>
             </a:r>
             <a:endParaRPr lang="en-US" dirty="0"/>
           </a:p>
@@ -6546,6 +6864,9 @@
             </a:r>
           </a:p>
           <a:p>
+            <a:pPr marL="0" indent="0">
+              <a:buNone/>
+            </a:pPr>
             <a:endParaRPr lang="en-GB" dirty="0"/>
           </a:p>
         </p:txBody>
@@ -6881,6 +7202,226 @@
   <p:clrMapOvr>
     <a:masterClrMapping/>
   </p:clrMapOvr>
+  <p:timing>
+    <p:tnLst>
+      <p:par>
+        <p:cTn id="1" dur="indefinite" restart="never" nodeType="tmRoot">
+          <p:childTnLst>
+            <p:seq concurrent="1" nextAc="seek">
+              <p:cTn id="2" dur="indefinite" nodeType="mainSeq">
+                <p:childTnLst>
+                  <p:par>
+                    <p:cTn id="3" fill="hold">
+                      <p:stCondLst>
+                        <p:cond delay="indefinite"/>
+                      </p:stCondLst>
+                      <p:childTnLst>
+                        <p:par>
+                          <p:cTn id="4" fill="hold">
+                            <p:stCondLst>
+                              <p:cond delay="0"/>
+                            </p:stCondLst>
+                            <p:childTnLst>
+                              <p:par>
+                                <p:cTn id="5" presetID="1" presetClass="entr" presetSubtype="0" fill="hold" grpId="0" nodeType="clickEffect">
+                                  <p:stCondLst>
+                                    <p:cond delay="0"/>
+                                  </p:stCondLst>
+                                  <p:childTnLst>
+                                    <p:set>
+                                      <p:cBhvr>
+                                        <p:cTn id="6" dur="1" fill="hold">
+                                          <p:stCondLst>
+                                            <p:cond delay="0"/>
+                                          </p:stCondLst>
+                                        </p:cTn>
+                                        <p:tgtEl>
+                                          <p:spTgt spid="2"/>
+                                        </p:tgtEl>
+                                        <p:attrNameLst>
+                                          <p:attrName>style.visibility</p:attrName>
+                                        </p:attrNameLst>
+                                      </p:cBhvr>
+                                      <p:to>
+                                        <p:strVal val="visible"/>
+                                      </p:to>
+                                    </p:set>
+                                  </p:childTnLst>
+                                </p:cTn>
+                              </p:par>
+                            </p:childTnLst>
+                          </p:cTn>
+                        </p:par>
+                      </p:childTnLst>
+                    </p:cTn>
+                  </p:par>
+                  <p:par>
+                    <p:cTn id="7" fill="hold">
+                      <p:stCondLst>
+                        <p:cond delay="indefinite"/>
+                      </p:stCondLst>
+                      <p:childTnLst>
+                        <p:par>
+                          <p:cTn id="8" fill="hold">
+                            <p:stCondLst>
+                              <p:cond delay="0"/>
+                            </p:stCondLst>
+                            <p:childTnLst>
+                              <p:par>
+                                <p:cTn id="9" presetID="1" presetClass="entr" presetSubtype="0" fill="hold" nodeType="clickEffect">
+                                  <p:stCondLst>
+                                    <p:cond delay="0"/>
+                                  </p:stCondLst>
+                                  <p:childTnLst>
+                                    <p:set>
+                                      <p:cBhvr>
+                                        <p:cTn id="10" dur="1" fill="hold">
+                                          <p:stCondLst>
+                                            <p:cond delay="0"/>
+                                          </p:stCondLst>
+                                        </p:cTn>
+                                        <p:tgtEl>
+                                          <p:spTgt spid="3">
+                                            <p:txEl>
+                                              <p:pRg st="0" end="0"/>
+                                            </p:txEl>
+                                          </p:spTgt>
+                                        </p:tgtEl>
+                                        <p:attrNameLst>
+                                          <p:attrName>style.visibility</p:attrName>
+                                        </p:attrNameLst>
+                                      </p:cBhvr>
+                                      <p:to>
+                                        <p:strVal val="visible"/>
+                                      </p:to>
+                                    </p:set>
+                                  </p:childTnLst>
+                                </p:cTn>
+                              </p:par>
+                              <p:par>
+                                <p:cTn id="11" presetID="1" presetClass="entr" presetSubtype="0" fill="hold" nodeType="withEffect">
+                                  <p:stCondLst>
+                                    <p:cond delay="0"/>
+                                  </p:stCondLst>
+                                  <p:childTnLst>
+                                    <p:set>
+                                      <p:cBhvr>
+                                        <p:cTn id="12" dur="1" fill="hold">
+                                          <p:stCondLst>
+                                            <p:cond delay="0"/>
+                                          </p:stCondLst>
+                                        </p:cTn>
+                                        <p:tgtEl>
+                                          <p:spTgt spid="3">
+                                            <p:txEl>
+                                              <p:pRg st="1" end="1"/>
+                                            </p:txEl>
+                                          </p:spTgt>
+                                        </p:tgtEl>
+                                        <p:attrNameLst>
+                                          <p:attrName>style.visibility</p:attrName>
+                                        </p:attrNameLst>
+                                      </p:cBhvr>
+                                      <p:to>
+                                        <p:strVal val="visible"/>
+                                      </p:to>
+                                    </p:set>
+                                  </p:childTnLst>
+                                </p:cTn>
+                              </p:par>
+                              <p:par>
+                                <p:cTn id="13" presetID="1" presetClass="entr" presetSubtype="0" fill="hold" nodeType="withEffect">
+                                  <p:stCondLst>
+                                    <p:cond delay="0"/>
+                                  </p:stCondLst>
+                                  <p:childTnLst>
+                                    <p:set>
+                                      <p:cBhvr>
+                                        <p:cTn id="14" dur="1" fill="hold">
+                                          <p:stCondLst>
+                                            <p:cond delay="0"/>
+                                          </p:stCondLst>
+                                        </p:cTn>
+                                        <p:tgtEl>
+                                          <p:spTgt spid="3">
+                                            <p:txEl>
+                                              <p:pRg st="2" end="2"/>
+                                            </p:txEl>
+                                          </p:spTgt>
+                                        </p:tgtEl>
+                                        <p:attrNameLst>
+                                          <p:attrName>style.visibility</p:attrName>
+                                        </p:attrNameLst>
+                                      </p:cBhvr>
+                                      <p:to>
+                                        <p:strVal val="visible"/>
+                                      </p:to>
+                                    </p:set>
+                                  </p:childTnLst>
+                                </p:cTn>
+                              </p:par>
+                              <p:par>
+                                <p:cTn id="15" presetID="1" presetClass="entr" presetSubtype="0" fill="hold" nodeType="withEffect">
+                                  <p:stCondLst>
+                                    <p:cond delay="0"/>
+                                  </p:stCondLst>
+                                  <p:childTnLst>
+                                    <p:set>
+                                      <p:cBhvr>
+                                        <p:cTn id="16" dur="1" fill="hold">
+                                          <p:stCondLst>
+                                            <p:cond delay="0"/>
+                                          </p:stCondLst>
+                                        </p:cTn>
+                                        <p:tgtEl>
+                                          <p:spTgt spid="3">
+                                            <p:txEl>
+                                              <p:pRg st="3" end="3"/>
+                                            </p:txEl>
+                                          </p:spTgt>
+                                        </p:tgtEl>
+                                        <p:attrNameLst>
+                                          <p:attrName>style.visibility</p:attrName>
+                                        </p:attrNameLst>
+                                      </p:cBhvr>
+                                      <p:to>
+                                        <p:strVal val="visible"/>
+                                      </p:to>
+                                    </p:set>
+                                  </p:childTnLst>
+                                </p:cTn>
+                              </p:par>
+                            </p:childTnLst>
+                          </p:cTn>
+                        </p:par>
+                      </p:childTnLst>
+                    </p:cTn>
+                  </p:par>
+                </p:childTnLst>
+              </p:cTn>
+              <p:prevCondLst>
+                <p:cond evt="onPrev" delay="0">
+                  <p:tgtEl>
+                    <p:sldTgt/>
+                  </p:tgtEl>
+                </p:cond>
+              </p:prevCondLst>
+              <p:nextCondLst>
+                <p:cond evt="onNext" delay="0">
+                  <p:tgtEl>
+                    <p:sldTgt/>
+                  </p:tgtEl>
+                </p:cond>
+              </p:nextCondLst>
+            </p:seq>
+          </p:childTnLst>
+        </p:cTn>
+      </p:par>
+    </p:tnLst>
+    <p:bldLst>
+      <p:bldP spid="2" grpId="0"/>
+    </p:bldLst>
+  </p:timing>
 </p:sld>
 </file>
 
@@ -6964,18 +7505,21 @@
             </a:r>
           </a:p>
           <a:p>
+            <a:pPr lvl="1"/>
             <a:r>
               <a:rPr lang="en-GB" dirty="0"/>
               <a:t>Branching</a:t>
             </a:r>
           </a:p>
           <a:p>
+            <a:pPr lvl="1"/>
             <a:r>
               <a:rPr lang="en-GB" dirty="0"/>
               <a:t>Commit messages</a:t>
             </a:r>
           </a:p>
           <a:p>
+            <a:pPr lvl="1"/>
             <a:r>
               <a:rPr lang="en-GB" dirty="0"/>
               <a:t>Pull Requests</a:t>
@@ -7020,6 +7564,196 @@
   <p:clrMapOvr>
     <a:masterClrMapping/>
   </p:clrMapOvr>
+  <p:timing>
+    <p:tnLst>
+      <p:par>
+        <p:cTn id="1" dur="indefinite" restart="never" nodeType="tmRoot">
+          <p:childTnLst>
+            <p:seq concurrent="1" nextAc="seek">
+              <p:cTn id="2" dur="indefinite" nodeType="mainSeq">
+                <p:childTnLst>
+                  <p:par>
+                    <p:cTn id="3" fill="hold">
+                      <p:stCondLst>
+                        <p:cond delay="indefinite"/>
+                      </p:stCondLst>
+                      <p:childTnLst>
+                        <p:par>
+                          <p:cTn id="4" fill="hold">
+                            <p:stCondLst>
+                              <p:cond delay="0"/>
+                            </p:stCondLst>
+                            <p:childTnLst>
+                              <p:par>
+                                <p:cTn id="5" presetID="1" presetClass="entr" presetSubtype="0" fill="hold" nodeType="clickEffect">
+                                  <p:stCondLst>
+                                    <p:cond delay="0"/>
+                                  </p:stCondLst>
+                                  <p:childTnLst>
+                                    <p:set>
+                                      <p:cBhvr>
+                                        <p:cTn id="6" dur="1" fill="hold">
+                                          <p:stCondLst>
+                                            <p:cond delay="0"/>
+                                          </p:stCondLst>
+                                        </p:cTn>
+                                        <p:tgtEl>
+                                          <p:spTgt spid="3">
+                                            <p:txEl>
+                                              <p:pRg st="1" end="1"/>
+                                            </p:txEl>
+                                          </p:spTgt>
+                                        </p:tgtEl>
+                                        <p:attrNameLst>
+                                          <p:attrName>style.visibility</p:attrName>
+                                        </p:attrNameLst>
+                                      </p:cBhvr>
+                                      <p:to>
+                                        <p:strVal val="visible"/>
+                                      </p:to>
+                                    </p:set>
+                                  </p:childTnLst>
+                                </p:cTn>
+                              </p:par>
+                            </p:childTnLst>
+                          </p:cTn>
+                        </p:par>
+                      </p:childTnLst>
+                    </p:cTn>
+                  </p:par>
+                  <p:par>
+                    <p:cTn id="7" fill="hold">
+                      <p:stCondLst>
+                        <p:cond delay="indefinite"/>
+                      </p:stCondLst>
+                      <p:childTnLst>
+                        <p:par>
+                          <p:cTn id="8" fill="hold">
+                            <p:stCondLst>
+                              <p:cond delay="0"/>
+                            </p:stCondLst>
+                            <p:childTnLst>
+                              <p:par>
+                                <p:cTn id="9" presetID="1" presetClass="entr" presetSubtype="0" fill="hold" nodeType="clickEffect">
+                                  <p:stCondLst>
+                                    <p:cond delay="0"/>
+                                  </p:stCondLst>
+                                  <p:childTnLst>
+                                    <p:set>
+                                      <p:cBhvr>
+                                        <p:cTn id="10" dur="1" fill="hold">
+                                          <p:stCondLst>
+                                            <p:cond delay="0"/>
+                                          </p:stCondLst>
+                                        </p:cTn>
+                                        <p:tgtEl>
+                                          <p:spTgt spid="3">
+                                            <p:txEl>
+                                              <p:pRg st="2" end="2"/>
+                                            </p:txEl>
+                                          </p:spTgt>
+                                        </p:tgtEl>
+                                        <p:attrNameLst>
+                                          <p:attrName>style.visibility</p:attrName>
+                                        </p:attrNameLst>
+                                      </p:cBhvr>
+                                      <p:to>
+                                        <p:strVal val="visible"/>
+                                      </p:to>
+                                    </p:set>
+                                  </p:childTnLst>
+                                </p:cTn>
+                              </p:par>
+                              <p:par>
+                                <p:cTn id="11" presetID="1" presetClass="entr" presetSubtype="0" fill="hold" nodeType="withEffect">
+                                  <p:stCondLst>
+                                    <p:cond delay="0"/>
+                                  </p:stCondLst>
+                                  <p:childTnLst>
+                                    <p:set>
+                                      <p:cBhvr>
+                                        <p:cTn id="12" dur="1" fill="hold">
+                                          <p:stCondLst>
+                                            <p:cond delay="0"/>
+                                          </p:stCondLst>
+                                        </p:cTn>
+                                        <p:tgtEl>
+                                          <p:spTgt spid="3">
+                                            <p:txEl>
+                                              <p:pRg st="3" end="3"/>
+                                            </p:txEl>
+                                          </p:spTgt>
+                                        </p:tgtEl>
+                                        <p:attrNameLst>
+                                          <p:attrName>style.visibility</p:attrName>
+                                        </p:attrNameLst>
+                                      </p:cBhvr>
+                                      <p:to>
+                                        <p:strVal val="visible"/>
+                                      </p:to>
+                                    </p:set>
+                                  </p:childTnLst>
+                                </p:cTn>
+                              </p:par>
+                              <p:par>
+                                <p:cTn id="13" presetID="1" presetClass="entr" presetSubtype="0" fill="hold" nodeType="withEffect">
+                                  <p:stCondLst>
+                                    <p:cond delay="0"/>
+                                  </p:stCondLst>
+                                  <p:childTnLst>
+                                    <p:set>
+                                      <p:cBhvr>
+                                        <p:cTn id="14" dur="1" fill="hold">
+                                          <p:stCondLst>
+                                            <p:cond delay="0"/>
+                                          </p:stCondLst>
+                                        </p:cTn>
+                                        <p:tgtEl>
+                                          <p:spTgt spid="3">
+                                            <p:txEl>
+                                              <p:pRg st="4" end="4"/>
+                                            </p:txEl>
+                                          </p:spTgt>
+                                        </p:tgtEl>
+                                        <p:attrNameLst>
+                                          <p:attrName>style.visibility</p:attrName>
+                                        </p:attrNameLst>
+                                      </p:cBhvr>
+                                      <p:to>
+                                        <p:strVal val="visible"/>
+                                      </p:to>
+                                    </p:set>
+                                  </p:childTnLst>
+                                </p:cTn>
+                              </p:par>
+                            </p:childTnLst>
+                          </p:cTn>
+                        </p:par>
+                      </p:childTnLst>
+                    </p:cTn>
+                  </p:par>
+                </p:childTnLst>
+              </p:cTn>
+              <p:prevCondLst>
+                <p:cond evt="onPrev" delay="0">
+                  <p:tgtEl>
+                    <p:sldTgt/>
+                  </p:tgtEl>
+                </p:cond>
+              </p:prevCondLst>
+              <p:nextCondLst>
+                <p:cond evt="onNext" delay="0">
+                  <p:tgtEl>
+                    <p:sldTgt/>
+                  </p:tgtEl>
+                </p:cond>
+              </p:nextCondLst>
+            </p:seq>
+          </p:childTnLst>
+        </p:cTn>
+      </p:par>
+    </p:tnLst>
+  </p:timing>
 </p:sld>
 </file>
 
@@ -7117,30 +7851,35 @@
             </a:r>
           </a:p>
           <a:p>
+            <a:pPr lvl="1"/>
             <a:r>
               <a:rPr lang="en-GB" dirty="0"/>
               <a:t>Master branch</a:t>
             </a:r>
           </a:p>
           <a:p>
+            <a:pPr lvl="1"/>
             <a:r>
               <a:rPr lang="en-GB" dirty="0"/>
               <a:t>Develop branch</a:t>
             </a:r>
           </a:p>
           <a:p>
+            <a:pPr lvl="1"/>
             <a:r>
               <a:rPr lang="en-GB" dirty="0"/>
               <a:t>Feature branches</a:t>
             </a:r>
           </a:p>
           <a:p>
+            <a:pPr lvl="1"/>
             <a:r>
               <a:rPr lang="en-GB" dirty="0"/>
               <a:t>Release branches</a:t>
             </a:r>
           </a:p>
           <a:p>
+            <a:pPr lvl="1"/>
             <a:r>
               <a:rPr lang="en-GB" dirty="0"/>
               <a:t>Hotfix branches</a:t>
@@ -11903,7 +12642,7 @@
           <a:p>
             <a:r>
               <a:rPr lang="en-GB" dirty="0"/>
-              <a:t>Commits</a:t>
+              <a:t>Commits and commit messages</a:t>
             </a:r>
           </a:p>
         </p:txBody>

</xml_diff>